<commit_message>
add error and update
</commit_message>
<xml_diff>
--- a/presentation/pendulum_theory.pptx
+++ b/presentation/pendulum_theory.pptx
@@ -5,7 +5,7 @@
     <p:sldMasterId id="2147483660" r:id="rId1"/>
   </p:sldMasterIdLst>
   <p:notesMasterIdLst>
-    <p:notesMasterId r:id="rId47"/>
+    <p:notesMasterId r:id="rId48"/>
   </p:notesMasterIdLst>
   <p:sldIdLst>
     <p:sldId id="256" r:id="rId2"/>
@@ -50,9 +50,10 @@
     <p:sldId id="302" r:id="rId41"/>
     <p:sldId id="303" r:id="rId42"/>
     <p:sldId id="304" r:id="rId43"/>
-    <p:sldId id="305" r:id="rId44"/>
-    <p:sldId id="306" r:id="rId45"/>
-    <p:sldId id="307" r:id="rId46"/>
+    <p:sldId id="308" r:id="rId44"/>
+    <p:sldId id="305" r:id="rId45"/>
+    <p:sldId id="306" r:id="rId46"/>
+    <p:sldId id="307" r:id="rId47"/>
   </p:sldIdLst>
   <p:sldSz cx="9144000" cy="6858000" type="screen4x3"/>
   <p:notesSz cx="6858000" cy="9144000"/>
@@ -696,7 +697,7 @@
           <a:bodyPr/>
           <a:lstStyle/>
           <a:p>
-            <a:fld id="{C39640DA-01F2-4EE1-9FB2-D81E8F6277C3}" type="datetime1">
+            <a:fld id="{BC7C53CE-6935-4080-A9E5-12D43E00DFE1}" type="datetime1">
               <a:rPr kumimoji="1" lang="ja-JP" altLang="en-US" smtClean="0"/>
               <a:t>2017/7/26</a:t>
             </a:fld>
@@ -905,7 +906,7 @@
           <a:bodyPr/>
           <a:lstStyle/>
           <a:p>
-            <a:fld id="{D581D386-1734-43A2-8181-60C016C90FD8}" type="datetime1">
+            <a:fld id="{593ED53D-8FED-423E-8E1B-300A71930808}" type="datetime1">
               <a:rPr kumimoji="1" lang="ja-JP" altLang="en-US" smtClean="0"/>
               <a:t>2017/7/26</a:t>
             </a:fld>
@@ -965,6 +966,13 @@
   <p:clrMapOvr>
     <a:masterClrMapping/>
   </p:clrMapOvr>
+  <p:timing>
+    <p:tnLst>
+      <p:par>
+        <p:cTn id="1" dur="indefinite" restart="never" nodeType="tmRoot"/>
+      </p:par>
+    </p:tnLst>
+  </p:timing>
 </p:sldLayout>
 </file>
 
@@ -1117,7 +1125,7 @@
           <a:bodyPr/>
           <a:lstStyle/>
           <a:p>
-            <a:fld id="{FAFDD80C-870D-48B5-AB62-251EF6F4CA65}" type="datetime1">
+            <a:fld id="{9290A6AE-E466-466A-8BB3-10918A2A3C7C}" type="datetime1">
               <a:rPr kumimoji="1" lang="ja-JP" altLang="en-US" smtClean="0"/>
               <a:t>2017/7/26</a:t>
             </a:fld>
@@ -1177,6 +1185,13 @@
   <p:clrMapOvr>
     <a:masterClrMapping/>
   </p:clrMapOvr>
+  <p:timing>
+    <p:tnLst>
+      <p:par>
+        <p:cTn id="1" dur="indefinite" restart="never" nodeType="tmRoot"/>
+      </p:par>
+    </p:tnLst>
+  </p:timing>
 </p:sldLayout>
 </file>
 
@@ -1335,7 +1350,7 @@
           <a:bodyPr/>
           <a:lstStyle/>
           <a:p>
-            <a:fld id="{D67C7FC8-B739-435D-B729-BF0ABAB3B454}" type="datetime1">
+            <a:fld id="{5DD4F5BD-5C63-4127-8B0A-4EB09877BB89}" type="datetime1">
               <a:rPr kumimoji="1" lang="ja-JP" altLang="en-US" smtClean="0"/>
               <a:t>2017/7/26</a:t>
             </a:fld>
@@ -1691,7 +1706,7 @@
           <a:bodyPr/>
           <a:lstStyle/>
           <a:p>
-            <a:fld id="{A9C65C7C-F382-4AFB-B8B7-900C5F32E725}" type="datetime1">
+            <a:fld id="{91695C74-405A-45B5-A939-58AC3C74FA2A}" type="datetime1">
               <a:rPr kumimoji="1" lang="ja-JP" altLang="en-US" smtClean="0"/>
               <a:t>2017/7/26</a:t>
             </a:fld>
@@ -1994,7 +2009,7 @@
           <a:bodyPr/>
           <a:lstStyle/>
           <a:p>
-            <a:fld id="{218687D5-A5C3-4D80-A647-4E83A686625A}" type="datetime1">
+            <a:fld id="{A47117C5-6D6A-4D2F-BF4C-886AF4195025}" type="datetime1">
               <a:rPr kumimoji="1" lang="ja-JP" altLang="en-US" smtClean="0"/>
               <a:t>2017/7/26</a:t>
             </a:fld>
@@ -2432,7 +2447,7 @@
           <a:bodyPr/>
           <a:lstStyle/>
           <a:p>
-            <a:fld id="{B826E6D6-844B-4145-9C2B-7B554F619ABB}" type="datetime1">
+            <a:fld id="{86C40BF7-4ED0-429A-BC3B-CF4E6BDFEBE2}" type="datetime1">
               <a:rPr kumimoji="1" lang="ja-JP" altLang="en-US" smtClean="0"/>
               <a:t>2017/7/26</a:t>
             </a:fld>
@@ -2492,6 +2507,13 @@
   <p:clrMapOvr>
     <a:masterClrMapping/>
   </p:clrMapOvr>
+  <p:timing>
+    <p:tnLst>
+      <p:par>
+        <p:cTn id="1" dur="indefinite" restart="never" nodeType="tmRoot"/>
+      </p:par>
+    </p:tnLst>
+  </p:timing>
 </p:sldLayout>
 </file>
 
@@ -2550,7 +2572,7 @@
           <a:bodyPr/>
           <a:lstStyle/>
           <a:p>
-            <a:fld id="{9178DD8F-3DF5-4D88-A800-EAEA28C5FA1A}" type="datetime1">
+            <a:fld id="{A60E353F-B205-4457-BB93-087B7C3EBB30}" type="datetime1">
               <a:rPr kumimoji="1" lang="ja-JP" altLang="en-US" smtClean="0"/>
               <a:t>2017/7/26</a:t>
             </a:fld>
@@ -2610,6 +2632,13 @@
   <p:clrMapOvr>
     <a:masterClrMapping/>
   </p:clrMapOvr>
+  <p:timing>
+    <p:tnLst>
+      <p:par>
+        <p:cTn id="1" dur="indefinite" restart="never" nodeType="tmRoot"/>
+      </p:par>
+    </p:tnLst>
+  </p:timing>
 </p:sldLayout>
 </file>
 
@@ -2645,7 +2674,7 @@
           <a:bodyPr/>
           <a:lstStyle/>
           <a:p>
-            <a:fld id="{469F3D63-F674-4223-843F-6B22069D3A49}" type="datetime1">
+            <a:fld id="{256AEED3-120C-40A9-8C92-D5CFE7DEC45F}" type="datetime1">
               <a:rPr kumimoji="1" lang="ja-JP" altLang="en-US" smtClean="0"/>
               <a:t>2017/7/26</a:t>
             </a:fld>
@@ -2705,6 +2734,13 @@
   <p:clrMapOvr>
     <a:masterClrMapping/>
   </p:clrMapOvr>
+  <p:timing>
+    <p:tnLst>
+      <p:par>
+        <p:cTn id="1" dur="indefinite" restart="never" nodeType="tmRoot"/>
+      </p:par>
+    </p:tnLst>
+  </p:timing>
 </p:sldLayout>
 </file>
 
@@ -2954,7 +2990,7 @@
           <a:bodyPr/>
           <a:lstStyle/>
           <a:p>
-            <a:fld id="{42BB8E51-10EE-4D61-A2E5-9E648E907DA2}" type="datetime1">
+            <a:fld id="{D702AC3B-4B0B-4ED5-9E56-5CF6E8AF77B2}" type="datetime1">
               <a:rPr kumimoji="1" lang="ja-JP" altLang="en-US" smtClean="0"/>
               <a:t>2017/7/26</a:t>
             </a:fld>
@@ -3014,6 +3050,13 @@
   <p:clrMapOvr>
     <a:masterClrMapping/>
   </p:clrMapOvr>
+  <p:timing>
+    <p:tnLst>
+      <p:par>
+        <p:cTn id="1" dur="indefinite" restart="never" nodeType="tmRoot"/>
+      </p:par>
+    </p:tnLst>
+  </p:timing>
 </p:sldLayout>
 </file>
 
@@ -3211,7 +3254,7 @@
           <a:bodyPr/>
           <a:lstStyle/>
           <a:p>
-            <a:fld id="{14D37A31-4D62-4151-AF5D-C77A426BC59C}" type="datetime1">
+            <a:fld id="{4593AA8D-D271-4148-A3F5-10D2116D3403}" type="datetime1">
               <a:rPr kumimoji="1" lang="ja-JP" altLang="en-US" smtClean="0"/>
               <a:t>2017/7/26</a:t>
             </a:fld>
@@ -3271,6 +3314,13 @@
   <p:clrMapOvr>
     <a:masterClrMapping/>
   </p:clrMapOvr>
+  <p:timing>
+    <p:tnLst>
+      <p:par>
+        <p:cTn id="1" dur="indefinite" restart="never" nodeType="tmRoot"/>
+      </p:par>
+    </p:tnLst>
+  </p:timing>
 </p:sldLayout>
 </file>
 
@@ -3456,7 +3506,7 @@
             </a:lvl1pPr>
           </a:lstStyle>
           <a:p>
-            <a:fld id="{CA7EAE47-AFA5-4621-BC2B-E9D95EB91215}" type="datetime1">
+            <a:fld id="{317F2C34-9905-4878-B47C-F19011B08158}" type="datetime1">
               <a:rPr kumimoji="1" lang="ja-JP" altLang="en-US" smtClean="0"/>
               <a:t>2017/7/26</a:t>
             </a:fld>
@@ -7195,8 +7245,8 @@
           </p:sp>
         </mc:Fallback>
       </mc:AlternateContent>
-      <mc:AlternateContent xmlns:mc="http://schemas.openxmlformats.org/markup-compatibility/2006">
-        <mc:Choice xmlns:a14="http://schemas.microsoft.com/office/drawing/2010/main" Requires="a14">
+      <mc:AlternateContent xmlns:mc="http://schemas.openxmlformats.org/markup-compatibility/2006" xmlns:a14="http://schemas.microsoft.com/office/drawing/2010/main">
+        <mc:Choice Requires="a14">
           <p:sp>
             <p:nvSpPr>
               <p:cNvPr id="3" name="コンテンツ プレースホルダー 2"/>
@@ -7315,7 +7365,6 @@
                   <a:rPr lang="en-US" altLang="ja-JP" dirty="0" smtClean="0"/>
                   <a:t>	 </a:t>
                 </a:r>
-                <a:endParaRPr lang="en-US" altLang="ja-JP" dirty="0" smtClean="0"/>
               </a:p>
               <a:p>
                 <a:pPr marL="0" indent="0">
@@ -7327,26 +7376,18 @@
                 </a:r>
                 <a:r>
                   <a:rPr lang="en-US" altLang="ja-JP" dirty="0" smtClean="0"/>
-                  <a:t>           </a:t>
-                </a:r>
-                <a:r>
-                  <a:rPr lang="en-US" altLang="ja-JP" dirty="0" smtClean="0"/>
-                  <a:t> </a:t>
+                  <a:t>            </a:t>
                 </a:r>
                 <a:r>
                   <a:rPr lang="ja-JP" altLang="en-US" dirty="0" smtClean="0"/>
-                  <a:t>で</a:t>
-                </a:r>
-                <a:r>
-                  <a:rPr lang="ja-JP" altLang="en-US" dirty="0" smtClean="0"/>
-                  <a:t>重心位置を確定</a:t>
+                  <a:t>で重心位置を確定</a:t>
                 </a:r>
                 <a:endParaRPr kumimoji="1" lang="en-US" altLang="ja-JP" dirty="0" smtClean="0"/>
               </a:p>
             </p:txBody>
           </p:sp>
         </mc:Choice>
-        <mc:Fallback>
+        <mc:Fallback xmlns="">
           <p:sp>
             <p:nvSpPr>
               <p:cNvPr id="3" name="コンテンツ プレースホルダー 2"/>
@@ -7844,8 +7885,8 @@
           </a:p>
         </p:txBody>
       </p:sp>
-      <mc:AlternateContent xmlns:mc="http://schemas.openxmlformats.org/markup-compatibility/2006">
-        <mc:Choice xmlns:a14="http://schemas.microsoft.com/office/drawing/2010/main" Requires="a14">
+      <mc:AlternateContent xmlns:mc="http://schemas.openxmlformats.org/markup-compatibility/2006" xmlns:a14="http://schemas.microsoft.com/office/drawing/2010/main">
+        <mc:Choice Requires="a14">
           <p:sp>
             <p:nvSpPr>
               <p:cNvPr id="6" name="テキスト ボックス 5"/>
@@ -7924,7 +7965,7 @@
             </p:txBody>
           </p:sp>
         </mc:Choice>
-        <mc:Fallback>
+        <mc:Fallback xmlns="">
           <p:sp>
             <p:nvSpPr>
               <p:cNvPr id="6" name="テキスト ボックス 5"/>
@@ -7963,8 +8004,8 @@
           </p:sp>
         </mc:Fallback>
       </mc:AlternateContent>
-      <mc:AlternateContent xmlns:mc="http://schemas.openxmlformats.org/markup-compatibility/2006">
-        <mc:Choice xmlns:a14="http://schemas.microsoft.com/office/drawing/2010/main" Requires="a14">
+      <mc:AlternateContent xmlns:mc="http://schemas.openxmlformats.org/markup-compatibility/2006" xmlns:a14="http://schemas.microsoft.com/office/drawing/2010/main">
+        <mc:Choice Requires="a14">
           <p:sp>
             <p:nvSpPr>
               <p:cNvPr id="7" name="正方形/長方形 6"/>
@@ -8041,7 +8082,7 @@
             </p:txBody>
           </p:sp>
         </mc:Choice>
-        <mc:Fallback>
+        <mc:Fallback xmlns="">
           <p:sp>
             <p:nvSpPr>
               <p:cNvPr id="7" name="正方形/長方形 6"/>
@@ -8387,8 +8428,8 @@
           </p:sp>
         </mc:Fallback>
       </mc:AlternateContent>
-      <mc:AlternateContent xmlns:mc="http://schemas.openxmlformats.org/markup-compatibility/2006">
-        <mc:Choice xmlns:a14="http://schemas.microsoft.com/office/drawing/2010/main" Requires="a14">
+      <mc:AlternateContent xmlns:mc="http://schemas.openxmlformats.org/markup-compatibility/2006" xmlns:a14="http://schemas.microsoft.com/office/drawing/2010/main">
+        <mc:Choice Requires="a14">
           <p:sp>
             <p:nvSpPr>
               <p:cNvPr id="3" name="コンテンツ プレースホルダー 2"/>
@@ -8560,11 +8601,7 @@
                 </a:r>
                 <a:r>
                   <a:rPr kumimoji="1" lang="ja-JP" altLang="en-US" dirty="0" smtClean="0"/>
-                  <a:t>両傾き</a:t>
-                </a:r>
-                <a:r>
-                  <a:rPr kumimoji="1" lang="ja-JP" altLang="en-US" dirty="0" smtClean="0"/>
-                  <a:t>を平均する</a:t>
+                  <a:t>両傾きを平均する</a:t>
                 </a:r>
                 <a:r>
                   <a:rPr kumimoji="1" lang="en-US" altLang="ja-JP" dirty="0" smtClean="0"/>
@@ -8575,7 +8612,7 @@
             </p:txBody>
           </p:sp>
         </mc:Choice>
-        <mc:Fallback>
+        <mc:Fallback xmlns="">
           <p:sp>
             <p:nvSpPr>
               <p:cNvPr id="3" name="コンテンツ プレースホルダー 2"/>
@@ -8984,8 +9021,8 @@
           <a:chExt cx="0" cy="0"/>
         </a:xfrm>
       </p:grpSpPr>
-      <mc:AlternateContent xmlns:mc="http://schemas.openxmlformats.org/markup-compatibility/2006">
-        <mc:Choice xmlns:a14="http://schemas.microsoft.com/office/drawing/2010/main" Requires="a14">
+      <mc:AlternateContent xmlns:mc="http://schemas.openxmlformats.org/markup-compatibility/2006" xmlns:a14="http://schemas.microsoft.com/office/drawing/2010/main">
+        <mc:Choice Requires="a14">
           <p:sp>
             <p:nvSpPr>
               <p:cNvPr id="2" name="タイトル 1"/>
@@ -9044,7 +9081,7 @@
             </p:txBody>
           </p:sp>
         </mc:Choice>
-        <mc:Fallback>
+        <mc:Fallback xmlns="">
           <p:sp>
             <p:nvSpPr>
               <p:cNvPr id="2" name="タイトル 1"/>
@@ -9109,15 +9146,7 @@
             </a:pPr>
             <a:r>
               <a:rPr kumimoji="1" lang="ja-JP" altLang="en-US" dirty="0" smtClean="0"/>
-              <a:t>台車</a:t>
-            </a:r>
-            <a:r>
-              <a:rPr kumimoji="1" lang="ja-JP" altLang="en-US" dirty="0" smtClean="0"/>
-              <a:t>系システムのステップ</a:t>
-            </a:r>
-            <a:r>
-              <a:rPr kumimoji="1" lang="ja-JP" altLang="en-US" dirty="0" smtClean="0"/>
-              <a:t>応答</a:t>
+              <a:t>台車系システムのステップ応答</a:t>
             </a:r>
             <a:r>
               <a:rPr lang="ja-JP" altLang="en-US" dirty="0" smtClean="0"/>
@@ -11403,6 +11432,30 @@
               <a:t>制御</a:t>
             </a:r>
             <a:endParaRPr kumimoji="1" lang="en-US" altLang="ja-JP" dirty="0" smtClean="0"/>
+          </a:p>
+        </p:txBody>
+      </p:sp>
+      <p:sp>
+        <p:nvSpPr>
+          <p:cNvPr id="4" name="スライド番号プレースホルダー 3"/>
+          <p:cNvSpPr>
+            <a:spLocks noGrp="1"/>
+          </p:cNvSpPr>
+          <p:nvPr>
+            <p:ph type="sldNum" sz="quarter" idx="12"/>
+          </p:nvPr>
+        </p:nvSpPr>
+        <p:spPr/>
+        <p:txBody>
+          <a:bodyPr/>
+          <a:lstStyle/>
+          <a:p>
+            <a:fld id="{879872E2-8930-43A6-82EA-52DD58EFA9F7}" type="slidenum">
+              <a:rPr lang="ja-JP" altLang="en-US" smtClean="0"/>
+              <a:pPr/>
+              <a:t>34</a:t>
+            </a:fld>
+            <a:endParaRPr lang="ja-JP" altLang="en-US" dirty="0"/>
           </a:p>
         </p:txBody>
       </p:sp>
@@ -11914,6 +11967,30 @@
           </a:p>
         </p:txBody>
       </p:sp>
+      <p:sp>
+        <p:nvSpPr>
+          <p:cNvPr id="5" name="スライド番号プレースホルダー 4"/>
+          <p:cNvSpPr>
+            <a:spLocks noGrp="1"/>
+          </p:cNvSpPr>
+          <p:nvPr>
+            <p:ph type="sldNum" sz="quarter" idx="12"/>
+          </p:nvPr>
+        </p:nvSpPr>
+        <p:spPr/>
+        <p:txBody>
+          <a:bodyPr/>
+          <a:lstStyle/>
+          <a:p>
+            <a:fld id="{879872E2-8930-43A6-82EA-52DD58EFA9F7}" type="slidenum">
+              <a:rPr lang="ja-JP" altLang="en-US" smtClean="0"/>
+              <a:pPr/>
+              <a:t>35</a:t>
+            </a:fld>
+            <a:endParaRPr lang="ja-JP" altLang="en-US" dirty="0"/>
+          </a:p>
+        </p:txBody>
+      </p:sp>
     </p:spTree>
     <p:extLst>
       <p:ext uri="{BB962C8B-B14F-4D97-AF65-F5344CB8AC3E}">
@@ -12414,6 +12491,30 @@
           </p:sp>
         </mc:Fallback>
       </mc:AlternateContent>
+      <p:sp>
+        <p:nvSpPr>
+          <p:cNvPr id="4" name="スライド番号プレースホルダー 3"/>
+          <p:cNvSpPr>
+            <a:spLocks noGrp="1"/>
+          </p:cNvSpPr>
+          <p:nvPr>
+            <p:ph type="sldNum" sz="quarter" idx="12"/>
+          </p:nvPr>
+        </p:nvSpPr>
+        <p:spPr/>
+        <p:txBody>
+          <a:bodyPr/>
+          <a:lstStyle/>
+          <a:p>
+            <a:fld id="{879872E2-8930-43A6-82EA-52DD58EFA9F7}" type="slidenum">
+              <a:rPr lang="ja-JP" altLang="en-US" smtClean="0"/>
+              <a:pPr/>
+              <a:t>36</a:t>
+            </a:fld>
+            <a:endParaRPr lang="ja-JP" altLang="en-US" dirty="0"/>
+          </a:p>
+        </p:txBody>
+      </p:sp>
     </p:spTree>
     <p:extLst>
       <p:ext uri="{BB962C8B-B14F-4D97-AF65-F5344CB8AC3E}">
@@ -13267,6 +13368,30 @@
           </p:sp>
         </mc:Fallback>
       </mc:AlternateContent>
+      <p:sp>
+        <p:nvSpPr>
+          <p:cNvPr id="3" name="スライド番号プレースホルダー 2"/>
+          <p:cNvSpPr>
+            <a:spLocks noGrp="1"/>
+          </p:cNvSpPr>
+          <p:nvPr>
+            <p:ph type="sldNum" sz="quarter" idx="12"/>
+          </p:nvPr>
+        </p:nvSpPr>
+        <p:spPr/>
+        <p:txBody>
+          <a:bodyPr/>
+          <a:lstStyle/>
+          <a:p>
+            <a:fld id="{879872E2-8930-43A6-82EA-52DD58EFA9F7}" type="slidenum">
+              <a:rPr lang="ja-JP" altLang="en-US" smtClean="0"/>
+              <a:pPr/>
+              <a:t>37</a:t>
+            </a:fld>
+            <a:endParaRPr lang="ja-JP" altLang="en-US" dirty="0"/>
+          </a:p>
+        </p:txBody>
+      </p:sp>
     </p:spTree>
     <p:extLst>
       <p:ext uri="{BB962C8B-B14F-4D97-AF65-F5344CB8AC3E}">
@@ -14124,6 +14249,30 @@
           </p:sp>
         </mc:Fallback>
       </mc:AlternateContent>
+      <p:sp>
+        <p:nvSpPr>
+          <p:cNvPr id="3" name="スライド番号プレースホルダー 2"/>
+          <p:cNvSpPr>
+            <a:spLocks noGrp="1"/>
+          </p:cNvSpPr>
+          <p:nvPr>
+            <p:ph type="sldNum" sz="quarter" idx="12"/>
+          </p:nvPr>
+        </p:nvSpPr>
+        <p:spPr/>
+        <p:txBody>
+          <a:bodyPr/>
+          <a:lstStyle/>
+          <a:p>
+            <a:fld id="{879872E2-8930-43A6-82EA-52DD58EFA9F7}" type="slidenum">
+              <a:rPr lang="ja-JP" altLang="en-US" smtClean="0"/>
+              <a:pPr/>
+              <a:t>38</a:t>
+            </a:fld>
+            <a:endParaRPr lang="ja-JP" altLang="en-US" dirty="0"/>
+          </a:p>
+        </p:txBody>
+      </p:sp>
     </p:spTree>
     <p:extLst>
       <p:ext uri="{BB962C8B-B14F-4D97-AF65-F5344CB8AC3E}">
@@ -14612,6 +14761,30 @@
           </p:sp>
         </mc:Fallback>
       </mc:AlternateContent>
+      <p:sp>
+        <p:nvSpPr>
+          <p:cNvPr id="4" name="スライド番号プレースホルダー 3"/>
+          <p:cNvSpPr>
+            <a:spLocks noGrp="1"/>
+          </p:cNvSpPr>
+          <p:nvPr>
+            <p:ph type="sldNum" sz="quarter" idx="12"/>
+          </p:nvPr>
+        </p:nvSpPr>
+        <p:spPr/>
+        <p:txBody>
+          <a:bodyPr/>
+          <a:lstStyle/>
+          <a:p>
+            <a:fld id="{879872E2-8930-43A6-82EA-52DD58EFA9F7}" type="slidenum">
+              <a:rPr lang="ja-JP" altLang="en-US" smtClean="0"/>
+              <a:pPr/>
+              <a:t>39</a:t>
+            </a:fld>
+            <a:endParaRPr lang="ja-JP" altLang="en-US" dirty="0"/>
+          </a:p>
+        </p:txBody>
+      </p:sp>
     </p:spTree>
     <p:extLst>
       <p:ext uri="{BB962C8B-B14F-4D97-AF65-F5344CB8AC3E}">
@@ -15348,6 +15521,30 @@
           </p:sp>
         </mc:Fallback>
       </mc:AlternateContent>
+      <p:sp>
+        <p:nvSpPr>
+          <p:cNvPr id="3" name="スライド番号プレースホルダー 2"/>
+          <p:cNvSpPr>
+            <a:spLocks noGrp="1"/>
+          </p:cNvSpPr>
+          <p:nvPr>
+            <p:ph type="sldNum" sz="quarter" idx="12"/>
+          </p:nvPr>
+        </p:nvSpPr>
+        <p:spPr/>
+        <p:txBody>
+          <a:bodyPr/>
+          <a:lstStyle/>
+          <a:p>
+            <a:fld id="{879872E2-8930-43A6-82EA-52DD58EFA9F7}" type="slidenum">
+              <a:rPr lang="ja-JP" altLang="en-US" smtClean="0"/>
+              <a:pPr/>
+              <a:t>40</a:t>
+            </a:fld>
+            <a:endParaRPr lang="ja-JP" altLang="en-US" dirty="0"/>
+          </a:p>
+        </p:txBody>
+      </p:sp>
     </p:spTree>
     <p:extLst>
       <p:ext uri="{BB962C8B-B14F-4D97-AF65-F5344CB8AC3E}">
@@ -15903,6 +16100,30 @@
           </a:extLst>
         </p:spPr>
       </p:pic>
+      <p:sp>
+        <p:nvSpPr>
+          <p:cNvPr id="4" name="スライド番号プレースホルダー 3"/>
+          <p:cNvSpPr>
+            <a:spLocks noGrp="1"/>
+          </p:cNvSpPr>
+          <p:nvPr>
+            <p:ph type="sldNum" sz="quarter" idx="12"/>
+          </p:nvPr>
+        </p:nvSpPr>
+        <p:spPr/>
+        <p:txBody>
+          <a:bodyPr/>
+          <a:lstStyle/>
+          <a:p>
+            <a:fld id="{879872E2-8930-43A6-82EA-52DD58EFA9F7}" type="slidenum">
+              <a:rPr lang="ja-JP" altLang="en-US" smtClean="0"/>
+              <a:pPr/>
+              <a:t>41</a:t>
+            </a:fld>
+            <a:endParaRPr lang="ja-JP" altLang="en-US" dirty="0"/>
+          </a:p>
+        </p:txBody>
+      </p:sp>
     </p:spTree>
     <p:extLst>
       <p:ext uri="{BB962C8B-B14F-4D97-AF65-F5344CB8AC3E}">
@@ -16998,8 +17219,8 @@
           </a:p>
         </p:txBody>
       </p:sp>
-      <mc:AlternateContent xmlns:mc="http://schemas.openxmlformats.org/markup-compatibility/2006" xmlns:a14="http://schemas.microsoft.com/office/drawing/2010/main">
-        <mc:Choice Requires="a14">
+      <mc:AlternateContent xmlns:mc="http://schemas.openxmlformats.org/markup-compatibility/2006">
+        <mc:Choice xmlns:a14="http://schemas.microsoft.com/office/drawing/2010/main" Requires="a14">
           <p:sp>
             <p:nvSpPr>
               <p:cNvPr id="14" name="テキスト ボックス 13"/>
@@ -17009,7 +17230,7 @@
             <p:spPr>
               <a:xfrm>
                 <a:off x="2016842" y="5530647"/>
-                <a:ext cx="3297811" cy="843501"/>
+                <a:ext cx="3818350" cy="843501"/>
               </a:xfrm>
               <a:prstGeom prst="rect">
                 <a:avLst/>
@@ -17060,7 +17281,7 @@
             </p:txBody>
           </p:sp>
         </mc:Choice>
-        <mc:Fallback xmlns="">
+        <mc:Fallback>
           <p:sp>
             <p:nvSpPr>
               <p:cNvPr id="14" name="テキスト ボックス 13"/>
@@ -17072,15 +17293,1235 @@
             <p:spPr>
               <a:xfrm>
                 <a:off x="2016842" y="5530647"/>
-                <a:ext cx="3297811" cy="843501"/>
+                <a:ext cx="3818350" cy="843501"/>
+              </a:xfrm>
+              <a:prstGeom prst="rect">
+                <a:avLst/>
+              </a:prstGeom>
+              <a:blipFill>
+                <a:blip r:embed="rId8"/>
+                <a:stretch>
+                  <a:fillRect l="-2556" t="-5755" b="-15827"/>
+                </a:stretch>
+              </a:blipFill>
+            </p:spPr>
+            <p:txBody>
+              <a:bodyPr/>
+              <a:lstStyle/>
+              <a:p>
+                <a:r>
+                  <a:rPr lang="ja-JP" altLang="en-US">
+                    <a:noFill/>
+                  </a:rPr>
+                  <a:t> </a:t>
+                </a:r>
+              </a:p>
+            </p:txBody>
+          </p:sp>
+        </mc:Fallback>
+      </mc:AlternateContent>
+      <p:sp>
+        <p:nvSpPr>
+          <p:cNvPr id="7" name="スライド番号プレースホルダー 6"/>
+          <p:cNvSpPr>
+            <a:spLocks noGrp="1"/>
+          </p:cNvSpPr>
+          <p:nvPr>
+            <p:ph type="sldNum" sz="quarter" idx="12"/>
+          </p:nvPr>
+        </p:nvSpPr>
+        <p:spPr/>
+        <p:txBody>
+          <a:bodyPr/>
+          <a:lstStyle/>
+          <a:p>
+            <a:fld id="{879872E2-8930-43A6-82EA-52DD58EFA9F7}" type="slidenum">
+              <a:rPr lang="ja-JP" altLang="en-US" smtClean="0"/>
+              <a:pPr/>
+              <a:t>42</a:t>
+            </a:fld>
+            <a:endParaRPr lang="ja-JP" altLang="en-US" dirty="0"/>
+          </a:p>
+        </p:txBody>
+      </p:sp>
+    </p:spTree>
+    <p:extLst>
+      <p:ext uri="{BB962C8B-B14F-4D97-AF65-F5344CB8AC3E}">
+        <p14:creationId xmlns:p14="http://schemas.microsoft.com/office/powerpoint/2010/main" val="863932517"/>
+      </p:ext>
+    </p:extLst>
+  </p:cSld>
+  <p:clrMapOvr>
+    <a:masterClrMapping/>
+  </p:clrMapOvr>
+  <p:timing>
+    <p:tnLst>
+      <p:par>
+        <p:cTn id="1" dur="indefinite" restart="never" nodeType="tmRoot"/>
+      </p:par>
+    </p:tnLst>
+  </p:timing>
+</p:sld>
+</file>
+
+<file path=ppt/slides/slide43.xml><?xml version="1.0" encoding="utf-8"?>
+<p:sld xmlns:a="http://schemas.openxmlformats.org/drawingml/2006/main" xmlns:r="http://schemas.openxmlformats.org/officeDocument/2006/relationships" xmlns:p="http://schemas.openxmlformats.org/presentationml/2006/main">
+  <p:cSld>
+    <p:spTree>
+      <p:nvGrpSpPr>
+        <p:cNvPr id="1" name=""/>
+        <p:cNvGrpSpPr/>
+        <p:nvPr/>
+      </p:nvGrpSpPr>
+      <p:grpSpPr>
+        <a:xfrm>
+          <a:off x="0" y="0"/>
+          <a:ext cx="0" cy="0"/>
+          <a:chOff x="0" y="0"/>
+          <a:chExt cx="0" cy="0"/>
+        </a:xfrm>
+      </p:grpSpPr>
+      <p:sp>
+        <p:nvSpPr>
+          <p:cNvPr id="2" name="タイトル 1"/>
+          <p:cNvSpPr>
+            <a:spLocks noGrp="1"/>
+          </p:cNvSpPr>
+          <p:nvPr>
+            <p:ph type="title"/>
+          </p:nvPr>
+        </p:nvSpPr>
+        <p:spPr/>
+        <p:txBody>
+          <a:bodyPr/>
+          <a:lstStyle/>
+          <a:p>
+            <a:r>
+              <a:rPr kumimoji="1" lang="ja-JP" altLang="en-US" dirty="0" smtClean="0"/>
+              <a:t>最小次元オブザーバ</a:t>
+            </a:r>
+            <a:endParaRPr kumimoji="1" lang="ja-JP" altLang="en-US" dirty="0"/>
+          </a:p>
+        </p:txBody>
+      </p:sp>
+      <p:sp>
+        <p:nvSpPr>
+          <p:cNvPr id="3" name="コンテンツ プレースホルダー 2"/>
+          <p:cNvSpPr>
+            <a:spLocks noGrp="1"/>
+          </p:cNvSpPr>
+          <p:nvPr>
+            <p:ph idx="1"/>
+          </p:nvPr>
+        </p:nvSpPr>
+        <p:spPr/>
+        <p:txBody>
+          <a:bodyPr>
+            <a:normAutofit/>
+          </a:bodyPr>
+          <a:lstStyle/>
+          <a:p>
+            <a:pPr marL="0" indent="0">
+              <a:buNone/>
+            </a:pPr>
+            <a:endParaRPr lang="en-US" altLang="ja-JP" sz="2400" dirty="0"/>
+          </a:p>
+          <a:p>
+            <a:pPr marL="0" indent="0">
+              <a:buNone/>
+            </a:pPr>
+            <a:r>
+              <a:rPr lang="ja-JP" altLang="en-US" sz="2400" dirty="0"/>
+              <a:t>　</a:t>
+            </a:r>
+            <a:r>
+              <a:rPr lang="ja-JP" altLang="en-US" sz="2400" dirty="0" smtClean="0"/>
+              <a:t>オブザーバ</a:t>
+            </a:r>
+            <a:endParaRPr lang="en-US" altLang="ja-JP" sz="2400" dirty="0" smtClean="0"/>
+          </a:p>
+          <a:p>
+            <a:endParaRPr lang="en-US" altLang="ja-JP" sz="2400" dirty="0" smtClean="0"/>
+          </a:p>
+          <a:p>
+            <a:pPr marL="0" indent="0">
+              <a:buNone/>
+            </a:pPr>
+            <a:endParaRPr lang="en-US" altLang="ja-JP" sz="2000" dirty="0"/>
+          </a:p>
+          <a:p>
+            <a:pPr marL="0" indent="0">
+              <a:buNone/>
+            </a:pPr>
+            <a:endParaRPr lang="en-US" altLang="ja-JP" sz="2400" dirty="0" smtClean="0"/>
+          </a:p>
+          <a:p>
+            <a:pPr marL="0" indent="0">
+              <a:buNone/>
+            </a:pPr>
+            <a:endParaRPr lang="en-US" altLang="ja-JP" sz="2400" dirty="0" smtClean="0"/>
+          </a:p>
+          <a:p>
+            <a:pPr marL="0" indent="0">
+              <a:buNone/>
+            </a:pPr>
+            <a:endParaRPr lang="en-US" altLang="ja-JP" sz="2400" dirty="0" smtClean="0"/>
+          </a:p>
+          <a:p>
+            <a:pPr marL="0" indent="0">
+              <a:buNone/>
+            </a:pPr>
+            <a:endParaRPr lang="en-US" altLang="ja-JP" sz="2400" dirty="0" smtClean="0"/>
+          </a:p>
+          <a:p>
+            <a:pPr marL="0" indent="0">
+              <a:buNone/>
+            </a:pPr>
+            <a:endParaRPr lang="en-US" altLang="ja-JP" sz="2400" i="1" dirty="0">
+              <a:latin typeface="Cambria Math" panose="02040503050406030204" pitchFamily="18" charset="0"/>
+            </a:endParaRPr>
+          </a:p>
+          <a:p>
+            <a:pPr marL="0" indent="0">
+              <a:buNone/>
+            </a:pPr>
+            <a:endParaRPr lang="en-US" altLang="ja-JP" sz="2400" dirty="0"/>
+          </a:p>
+        </p:txBody>
+      </p:sp>
+      <p:grpSp>
+        <p:nvGrpSpPr>
+          <p:cNvPr id="13" name="グループ化 12"/>
+          <p:cNvGrpSpPr/>
+          <p:nvPr/>
+        </p:nvGrpSpPr>
+        <p:grpSpPr>
+          <a:xfrm>
+            <a:off x="2589874" y="2047837"/>
+            <a:ext cx="2792670" cy="894962"/>
+            <a:chOff x="756467" y="2219421"/>
+            <a:chExt cx="2792670" cy="894962"/>
+          </a:xfrm>
+        </p:grpSpPr>
+        <mc:AlternateContent xmlns:mc="http://schemas.openxmlformats.org/markup-compatibility/2006" xmlns:a14="http://schemas.microsoft.com/office/drawing/2010/main">
+          <mc:Choice Requires="a14">
+            <p:sp>
+              <p:nvSpPr>
+                <p:cNvPr id="4" name="テキスト ボックス 3"/>
+                <p:cNvSpPr txBox="1"/>
+                <p:nvPr/>
+              </p:nvSpPr>
+              <p:spPr>
+                <a:xfrm>
+                  <a:off x="776440" y="2219421"/>
+                  <a:ext cx="2772697" cy="474169"/>
+                </a:xfrm>
+                <a:prstGeom prst="rect">
+                  <a:avLst/>
+                </a:prstGeom>
+                <a:noFill/>
+              </p:spPr>
+              <p:txBody>
+                <a:bodyPr wrap="square" rtlCol="0">
+                  <a:spAutoFit/>
+                </a:bodyPr>
+                <a:lstStyle/>
+                <a:p>
+                  <a:pPr/>
+                  <a14:m>
+                    <m:oMathPara xmlns:m="http://schemas.openxmlformats.org/officeDocument/2006/math">
+                      <m:oMathParaPr>
+                        <m:jc m:val="centerGroup"/>
+                      </m:oMathParaPr>
+                      <m:oMath xmlns:m="http://schemas.openxmlformats.org/officeDocument/2006/math">
+                        <m:acc>
+                          <m:accPr>
+                            <m:chr m:val="̇"/>
+                            <m:ctrlPr>
+                              <a:rPr lang="en-US" altLang="ja-JP" sz="2400" i="1">
+                                <a:latin typeface="Cambria Math" panose="02040503050406030204" pitchFamily="18" charset="0"/>
+                              </a:rPr>
+                            </m:ctrlPr>
+                          </m:accPr>
+                          <m:e>
+                            <m:r>
+                              <a:rPr lang="en-US" altLang="ja-JP" sz="2400" i="1">
+                                <a:latin typeface="Cambria Math" panose="02040503050406030204" pitchFamily="18" charset="0"/>
+                              </a:rPr>
+                              <m:t>𝑧</m:t>
+                            </m:r>
+                          </m:e>
+                        </m:acc>
+                        <m:r>
+                          <a:rPr lang="en-US" altLang="ja-JP" sz="2400" i="1">
+                            <a:latin typeface="Cambria Math" panose="02040503050406030204" pitchFamily="18" charset="0"/>
+                          </a:rPr>
+                          <m:t>=</m:t>
+                        </m:r>
+                        <m:acc>
+                          <m:accPr>
+                            <m:chr m:val="̂"/>
+                            <m:ctrlPr>
+                              <a:rPr lang="en-US" altLang="ja-JP" sz="2400" i="1">
+                                <a:latin typeface="Cambria Math" panose="02040503050406030204" pitchFamily="18" charset="0"/>
+                              </a:rPr>
+                            </m:ctrlPr>
+                          </m:accPr>
+                          <m:e>
+                            <m:r>
+                              <a:rPr lang="en-US" altLang="ja-JP" sz="2400" i="1">
+                                <a:latin typeface="Cambria Math" panose="02040503050406030204" pitchFamily="18" charset="0"/>
+                              </a:rPr>
+                              <m:t>𝐴</m:t>
+                            </m:r>
+                          </m:e>
+                        </m:acc>
+                        <m:r>
+                          <a:rPr lang="en-US" altLang="ja-JP" sz="2400" i="1">
+                            <a:latin typeface="Cambria Math" panose="02040503050406030204" pitchFamily="18" charset="0"/>
+                          </a:rPr>
+                          <m:t>𝑧</m:t>
+                        </m:r>
+                        <m:r>
+                          <a:rPr lang="en-US" altLang="ja-JP" sz="2400" i="1">
+                            <a:latin typeface="Cambria Math" panose="02040503050406030204" pitchFamily="18" charset="0"/>
+                          </a:rPr>
+                          <m:t>+</m:t>
+                        </m:r>
+                        <m:acc>
+                          <m:accPr>
+                            <m:chr m:val="̂"/>
+                            <m:ctrlPr>
+                              <a:rPr lang="en-US" altLang="ja-JP" sz="2400" i="1">
+                                <a:latin typeface="Cambria Math" panose="02040503050406030204" pitchFamily="18" charset="0"/>
+                              </a:rPr>
+                            </m:ctrlPr>
+                          </m:accPr>
+                          <m:e>
+                            <m:r>
+                              <a:rPr lang="en-US" altLang="ja-JP" sz="2400" i="1">
+                                <a:latin typeface="Cambria Math" panose="02040503050406030204" pitchFamily="18" charset="0"/>
+                              </a:rPr>
+                              <m:t>𝐵</m:t>
+                            </m:r>
+                          </m:e>
+                        </m:acc>
+                        <m:r>
+                          <a:rPr lang="en-US" altLang="ja-JP" sz="2400" i="1">
+                            <a:latin typeface="Cambria Math" panose="02040503050406030204" pitchFamily="18" charset="0"/>
+                          </a:rPr>
+                          <m:t>𝑦</m:t>
+                        </m:r>
+                        <m:r>
+                          <a:rPr lang="en-US" altLang="ja-JP" sz="2400" i="1">
+                            <a:latin typeface="Cambria Math" panose="02040503050406030204" pitchFamily="18" charset="0"/>
+                          </a:rPr>
+                          <m:t>+</m:t>
+                        </m:r>
+                        <m:acc>
+                          <m:accPr>
+                            <m:chr m:val="̂"/>
+                            <m:ctrlPr>
+                              <a:rPr lang="en-US" altLang="ja-JP" sz="2400" i="1">
+                                <a:latin typeface="Cambria Math" panose="02040503050406030204" pitchFamily="18" charset="0"/>
+                              </a:rPr>
+                            </m:ctrlPr>
+                          </m:accPr>
+                          <m:e>
+                            <m:r>
+                              <a:rPr lang="en-US" altLang="ja-JP" sz="2400" i="1">
+                                <a:latin typeface="Cambria Math" panose="02040503050406030204" pitchFamily="18" charset="0"/>
+                              </a:rPr>
+                              <m:t>𝐽</m:t>
+                            </m:r>
+                          </m:e>
+                        </m:acc>
+                        <m:r>
+                          <a:rPr lang="en-US" altLang="ja-JP" sz="2400" i="1">
+                            <a:latin typeface="Cambria Math" panose="02040503050406030204" pitchFamily="18" charset="0"/>
+                          </a:rPr>
+                          <m:t>𝑢</m:t>
+                        </m:r>
+                      </m:oMath>
+                    </m:oMathPara>
+                  </a14:m>
+                  <a:endParaRPr lang="en-US" altLang="ja-JP" sz="2400" dirty="0"/>
+                </a:p>
+              </p:txBody>
+            </p:sp>
+          </mc:Choice>
+          <mc:Fallback xmlns="">
+            <p:sp>
+              <p:nvSpPr>
+                <p:cNvPr id="4" name="テキスト ボックス 3"/>
+                <p:cNvSpPr txBox="1">
+                  <a:spLocks noRot="1" noChangeAspect="1" noMove="1" noResize="1" noEditPoints="1" noAdjustHandles="1" noChangeArrowheads="1" noChangeShapeType="1" noTextEdit="1"/>
+                </p:cNvSpPr>
+                <p:nvPr/>
+              </p:nvSpPr>
+              <p:spPr>
+                <a:xfrm>
+                  <a:off x="776440" y="2219421"/>
+                  <a:ext cx="2772697" cy="474169"/>
+                </a:xfrm>
+                <a:prstGeom prst="rect">
+                  <a:avLst/>
+                </a:prstGeom>
+                <a:blipFill rotWithShape="0">
+                  <a:blip r:embed="rId2"/>
+                  <a:stretch>
+                    <a:fillRect/>
+                  </a:stretch>
+                </a:blipFill>
+              </p:spPr>
+              <p:txBody>
+                <a:bodyPr/>
+                <a:lstStyle/>
+                <a:p>
+                  <a:r>
+                    <a:rPr lang="ja-JP" altLang="en-US">
+                      <a:noFill/>
+                    </a:rPr>
+                    <a:t> </a:t>
+                  </a:r>
+                </a:p>
+              </p:txBody>
+            </p:sp>
+          </mc:Fallback>
+        </mc:AlternateContent>
+        <mc:AlternateContent xmlns:mc="http://schemas.openxmlformats.org/markup-compatibility/2006" xmlns:a14="http://schemas.microsoft.com/office/drawing/2010/main">
+          <mc:Choice Requires="a14">
+            <p:sp>
+              <p:nvSpPr>
+                <p:cNvPr id="5" name="テキスト ボックス 4"/>
+                <p:cNvSpPr txBox="1"/>
+                <p:nvPr/>
+              </p:nvSpPr>
+              <p:spPr>
+                <a:xfrm>
+                  <a:off x="756467" y="2640214"/>
+                  <a:ext cx="2222090" cy="474169"/>
+                </a:xfrm>
+                <a:prstGeom prst="rect">
+                  <a:avLst/>
+                </a:prstGeom>
+                <a:noFill/>
+              </p:spPr>
+              <p:txBody>
+                <a:bodyPr wrap="square" rtlCol="0">
+                  <a:spAutoFit/>
+                </a:bodyPr>
+                <a:lstStyle/>
+                <a:p>
+                  <a:pPr/>
+                  <a14:m>
+                    <m:oMathPara xmlns:m="http://schemas.openxmlformats.org/officeDocument/2006/math">
+                      <m:oMathParaPr>
+                        <m:jc m:val="centerGroup"/>
+                      </m:oMathParaPr>
+                      <m:oMath xmlns:m="http://schemas.openxmlformats.org/officeDocument/2006/math">
+                        <m:acc>
+                          <m:accPr>
+                            <m:chr m:val="̂"/>
+                            <m:ctrlPr>
+                              <a:rPr lang="en-US" altLang="ja-JP" sz="2400" i="1" smtClean="0">
+                                <a:latin typeface="Cambria Math" panose="02040503050406030204" pitchFamily="18" charset="0"/>
+                              </a:rPr>
+                            </m:ctrlPr>
+                          </m:accPr>
+                          <m:e>
+                            <m:r>
+                              <a:rPr lang="en-US" altLang="ja-JP" sz="2400" b="0" i="1" smtClean="0">
+                                <a:latin typeface="Cambria Math" panose="02040503050406030204" pitchFamily="18" charset="0"/>
+                              </a:rPr>
+                              <m:t>𝑥</m:t>
+                            </m:r>
+                          </m:e>
+                        </m:acc>
+                        <m:r>
+                          <a:rPr lang="en-US" altLang="ja-JP" sz="2400" b="0" i="1" smtClean="0">
+                            <a:latin typeface="Cambria Math" panose="02040503050406030204" pitchFamily="18" charset="0"/>
+                          </a:rPr>
+                          <m:t>=</m:t>
+                        </m:r>
+                        <m:acc>
+                          <m:accPr>
+                            <m:chr m:val="̂"/>
+                            <m:ctrlPr>
+                              <a:rPr lang="en-US" altLang="ja-JP" sz="2400" i="1">
+                                <a:latin typeface="Cambria Math" panose="02040503050406030204" pitchFamily="18" charset="0"/>
+                              </a:rPr>
+                            </m:ctrlPr>
+                          </m:accPr>
+                          <m:e>
+                            <m:r>
+                              <a:rPr lang="en-US" altLang="ja-JP" sz="2400" b="0" i="1" smtClean="0">
+                                <a:latin typeface="Cambria Math" panose="02040503050406030204" pitchFamily="18" charset="0"/>
+                              </a:rPr>
+                              <m:t>𝐶</m:t>
+                            </m:r>
+                          </m:e>
+                        </m:acc>
+                        <m:r>
+                          <a:rPr lang="en-US" altLang="ja-JP" sz="2400" b="0" i="1" smtClean="0">
+                            <a:latin typeface="Cambria Math" panose="02040503050406030204" pitchFamily="18" charset="0"/>
+                          </a:rPr>
+                          <m:t>𝑧</m:t>
+                        </m:r>
+                        <m:r>
+                          <a:rPr lang="en-US" altLang="ja-JP" sz="2400" b="0" i="1" smtClean="0">
+                            <a:latin typeface="Cambria Math" panose="02040503050406030204" pitchFamily="18" charset="0"/>
+                          </a:rPr>
+                          <m:t>+</m:t>
+                        </m:r>
+                        <m:acc>
+                          <m:accPr>
+                            <m:chr m:val="̂"/>
+                            <m:ctrlPr>
+                              <a:rPr lang="en-US" altLang="ja-JP" sz="2400" i="1">
+                                <a:latin typeface="Cambria Math" panose="02040503050406030204" pitchFamily="18" charset="0"/>
+                              </a:rPr>
+                            </m:ctrlPr>
+                          </m:accPr>
+                          <m:e>
+                            <m:r>
+                              <a:rPr lang="en-US" altLang="ja-JP" sz="2400" b="0" i="1" smtClean="0">
+                                <a:latin typeface="Cambria Math" panose="02040503050406030204" pitchFamily="18" charset="0"/>
+                              </a:rPr>
+                              <m:t>𝐷</m:t>
+                            </m:r>
+                          </m:e>
+                        </m:acc>
+                        <m:r>
+                          <a:rPr lang="en-US" altLang="ja-JP" sz="2400" b="0" i="1" smtClean="0">
+                            <a:latin typeface="Cambria Math" panose="02040503050406030204" pitchFamily="18" charset="0"/>
+                          </a:rPr>
+                          <m:t>𝑦</m:t>
+                        </m:r>
+                      </m:oMath>
+                    </m:oMathPara>
+                  </a14:m>
+                  <a:endParaRPr kumimoji="1" lang="ja-JP" altLang="en-US" dirty="0"/>
+                </a:p>
+              </p:txBody>
+            </p:sp>
+          </mc:Choice>
+          <mc:Fallback xmlns="">
+            <p:sp>
+              <p:nvSpPr>
+                <p:cNvPr id="5" name="テキスト ボックス 4"/>
+                <p:cNvSpPr txBox="1">
+                  <a:spLocks noRot="1" noChangeAspect="1" noMove="1" noResize="1" noEditPoints="1" noAdjustHandles="1" noChangeArrowheads="1" noChangeShapeType="1" noTextEdit="1"/>
+                </p:cNvSpPr>
+                <p:nvPr/>
+              </p:nvSpPr>
+              <p:spPr>
+                <a:xfrm>
+                  <a:off x="756467" y="2640214"/>
+                  <a:ext cx="2222090" cy="474169"/>
+                </a:xfrm>
+                <a:prstGeom prst="rect">
+                  <a:avLst/>
+                </a:prstGeom>
+                <a:blipFill rotWithShape="0">
+                  <a:blip r:embed="rId3"/>
+                  <a:stretch>
+                    <a:fillRect/>
+                  </a:stretch>
+                </a:blipFill>
+              </p:spPr>
+              <p:txBody>
+                <a:bodyPr/>
+                <a:lstStyle/>
+                <a:p>
+                  <a:r>
+                    <a:rPr lang="ja-JP" altLang="en-US">
+                      <a:noFill/>
+                    </a:rPr>
+                    <a:t> </a:t>
+                  </a:r>
+                </a:p>
+              </p:txBody>
+            </p:sp>
+          </mc:Fallback>
+        </mc:AlternateContent>
+      </p:grpSp>
+      <mc:AlternateContent xmlns:mc="http://schemas.openxmlformats.org/markup-compatibility/2006" xmlns:a14="http://schemas.microsoft.com/office/drawing/2010/main">
+        <mc:Choice Requires="a14">
+          <p:sp>
+            <p:nvSpPr>
+              <p:cNvPr id="6" name="テキスト ボックス 5"/>
+              <p:cNvSpPr txBox="1"/>
+              <p:nvPr/>
+            </p:nvSpPr>
+            <p:spPr>
+              <a:xfrm>
+                <a:off x="834510" y="3087485"/>
+                <a:ext cx="5959580" cy="461665"/>
+              </a:xfrm>
+              <a:prstGeom prst="rect">
+                <a:avLst/>
+              </a:prstGeom>
+              <a:noFill/>
+            </p:spPr>
+            <p:txBody>
+              <a:bodyPr wrap="square" rtlCol="0">
+                <a:spAutoFit/>
+              </a:bodyPr>
+              <a:lstStyle/>
+              <a:p>
+                <a:r>
+                  <a:rPr lang="ja-JP" altLang="en-US" sz="2400" dirty="0" smtClean="0">
+                    <a:ea typeface="Cambria Math" panose="02040503050406030204" pitchFamily="18" charset="0"/>
+                  </a:rPr>
+                  <a:t>が　</a:t>
+                </a:r>
+                <a14:m>
+                  <m:oMath xmlns:m="http://schemas.openxmlformats.org/officeDocument/2006/math">
+                    <m:acc>
+                      <m:accPr>
+                        <m:chr m:val="̂"/>
+                        <m:ctrlPr>
+                          <a:rPr lang="en-US" altLang="ja-JP" sz="2400" i="1">
+                            <a:latin typeface="Cambria Math" panose="02040503050406030204" pitchFamily="18" charset="0"/>
+                            <a:ea typeface="Cambria Math" panose="02040503050406030204" pitchFamily="18" charset="0"/>
+                          </a:rPr>
+                        </m:ctrlPr>
+                      </m:accPr>
+                      <m:e>
+                        <m:r>
+                          <a:rPr lang="en-US" altLang="ja-JP" sz="2400" i="1">
+                            <a:latin typeface="Cambria Math" panose="02040503050406030204" pitchFamily="18" charset="0"/>
+                            <a:ea typeface="Cambria Math" panose="02040503050406030204" pitchFamily="18" charset="0"/>
+                          </a:rPr>
+                          <m:t>𝑥</m:t>
+                        </m:r>
+                      </m:e>
+                    </m:acc>
+                    <m:r>
+                      <a:rPr lang="en-US" altLang="ja-JP" sz="2400" i="1">
+                        <a:latin typeface="Cambria Math" panose="02040503050406030204" pitchFamily="18" charset="0"/>
+                        <a:ea typeface="Cambria Math" panose="02040503050406030204" pitchFamily="18" charset="0"/>
+                      </a:rPr>
+                      <m:t>→</m:t>
+                    </m:r>
+                    <m:r>
+                      <a:rPr lang="en-US" altLang="ja-JP" sz="2400" i="1">
+                        <a:latin typeface="Cambria Math" panose="02040503050406030204" pitchFamily="18" charset="0"/>
+                        <a:ea typeface="Cambria Math" panose="02040503050406030204" pitchFamily="18" charset="0"/>
+                      </a:rPr>
+                      <m:t>𝑥</m:t>
+                    </m:r>
+                    <m:d>
+                      <m:dPr>
+                        <m:ctrlPr>
+                          <a:rPr lang="en-US" altLang="ja-JP" sz="2400" i="1">
+                            <a:latin typeface="Cambria Math" panose="02040503050406030204" pitchFamily="18" charset="0"/>
+                            <a:ea typeface="Cambria Math" panose="02040503050406030204" pitchFamily="18" charset="0"/>
+                          </a:rPr>
+                        </m:ctrlPr>
+                      </m:dPr>
+                      <m:e>
+                        <m:r>
+                          <a:rPr lang="en-US" altLang="ja-JP" sz="2400" i="1">
+                            <a:latin typeface="Cambria Math" panose="02040503050406030204" pitchFamily="18" charset="0"/>
+                            <a:ea typeface="Cambria Math" panose="02040503050406030204" pitchFamily="18" charset="0"/>
+                          </a:rPr>
+                          <m:t>𝑡</m:t>
+                        </m:r>
+                        <m:r>
+                          <a:rPr lang="en-US" altLang="ja-JP" sz="2400" i="1">
+                            <a:latin typeface="Cambria Math" panose="02040503050406030204" pitchFamily="18" charset="0"/>
+                            <a:ea typeface="Cambria Math" panose="02040503050406030204" pitchFamily="18" charset="0"/>
+                          </a:rPr>
+                          <m:t>→∞</m:t>
+                        </m:r>
+                      </m:e>
+                    </m:d>
+                  </m:oMath>
+                </a14:m>
+                <a:r>
+                  <a:rPr kumimoji="1" lang="ja-JP" altLang="en-US" sz="2400" dirty="0" smtClean="0"/>
+                  <a:t>　を満たす十分条件</a:t>
+                </a:r>
+                <a:endParaRPr kumimoji="1" lang="en-US" altLang="ja-JP" sz="2400" dirty="0" smtClean="0"/>
+              </a:p>
+            </p:txBody>
+          </p:sp>
+        </mc:Choice>
+        <mc:Fallback xmlns="">
+          <p:sp>
+            <p:nvSpPr>
+              <p:cNvPr id="6" name="テキスト ボックス 5"/>
+              <p:cNvSpPr txBox="1">
+                <a:spLocks noRot="1" noChangeAspect="1" noMove="1" noResize="1" noEditPoints="1" noAdjustHandles="1" noChangeArrowheads="1" noChangeShapeType="1" noTextEdit="1"/>
+              </p:cNvSpPr>
+              <p:nvPr/>
+            </p:nvSpPr>
+            <p:spPr>
+              <a:xfrm>
+                <a:off x="834510" y="3087485"/>
+                <a:ext cx="5959580" cy="461665"/>
               </a:xfrm>
               <a:prstGeom prst="rect">
                 <a:avLst/>
               </a:prstGeom>
               <a:blipFill rotWithShape="0">
+                <a:blip r:embed="rId4"/>
+                <a:stretch>
+                  <a:fillRect l="-1636" t="-14474" b="-25000"/>
+                </a:stretch>
+              </a:blipFill>
+            </p:spPr>
+            <p:txBody>
+              <a:bodyPr/>
+              <a:lstStyle/>
+              <a:p>
+                <a:r>
+                  <a:rPr lang="ja-JP" altLang="en-US">
+                    <a:noFill/>
+                  </a:rPr>
+                  <a:t> </a:t>
+                </a:r>
+              </a:p>
+            </p:txBody>
+          </p:sp>
+        </mc:Fallback>
+      </mc:AlternateContent>
+      <p:grpSp>
+        <p:nvGrpSpPr>
+          <p:cNvPr id="11" name="グループ化 10"/>
+          <p:cNvGrpSpPr/>
+          <p:nvPr/>
+        </p:nvGrpSpPr>
+        <p:grpSpPr>
+          <a:xfrm>
+            <a:off x="1603889" y="4155340"/>
+            <a:ext cx="3028336" cy="1418571"/>
+            <a:chOff x="4065022" y="2911157"/>
+            <a:chExt cx="3028336" cy="1418571"/>
+          </a:xfrm>
+        </p:grpSpPr>
+        <mc:AlternateContent xmlns:mc="http://schemas.openxmlformats.org/markup-compatibility/2006" xmlns:a14="http://schemas.microsoft.com/office/drawing/2010/main">
+          <mc:Choice Requires="a14">
+            <p:sp>
+              <p:nvSpPr>
+                <p:cNvPr id="8" name="テキスト ボックス 7"/>
+                <p:cNvSpPr txBox="1"/>
+                <p:nvPr/>
+              </p:nvSpPr>
+              <p:spPr>
+                <a:xfrm>
+                  <a:off x="4065022" y="2911157"/>
+                  <a:ext cx="3028336" cy="474169"/>
+                </a:xfrm>
+                <a:prstGeom prst="rect">
+                  <a:avLst/>
+                </a:prstGeom>
+                <a:noFill/>
+              </p:spPr>
+              <p:txBody>
+                <a:bodyPr wrap="square" rtlCol="0">
+                  <a:spAutoFit/>
+                </a:bodyPr>
+                <a:lstStyle/>
+                <a:p>
+                  <a:pPr/>
+                  <a14:m>
+                    <m:oMathPara xmlns:m="http://schemas.openxmlformats.org/officeDocument/2006/math">
+                      <m:oMathParaPr>
+                        <m:jc m:val="centerGroup"/>
+                      </m:oMathParaPr>
+                      <m:oMath xmlns:m="http://schemas.openxmlformats.org/officeDocument/2006/math">
+                        <m:r>
+                          <a:rPr lang="en-US" altLang="ja-JP" sz="2400" i="1">
+                            <a:latin typeface="Cambria Math" panose="02040503050406030204" pitchFamily="18" charset="0"/>
+                          </a:rPr>
+                          <m:t>𝑈𝐴</m:t>
+                        </m:r>
+                        <m:r>
+                          <a:rPr lang="en-US" altLang="ja-JP" sz="2400" i="1">
+                            <a:latin typeface="Cambria Math" panose="02040503050406030204" pitchFamily="18" charset="0"/>
+                          </a:rPr>
+                          <m:t>=</m:t>
+                        </m:r>
+                        <m:acc>
+                          <m:accPr>
+                            <m:chr m:val="̂"/>
+                            <m:ctrlPr>
+                              <a:rPr lang="en-US" altLang="ja-JP" sz="2400" i="1">
+                                <a:latin typeface="Cambria Math" panose="02040503050406030204" pitchFamily="18" charset="0"/>
+                              </a:rPr>
+                            </m:ctrlPr>
+                          </m:accPr>
+                          <m:e>
+                            <m:r>
+                              <a:rPr lang="en-US" altLang="ja-JP" sz="2400" i="1">
+                                <a:latin typeface="Cambria Math" panose="02040503050406030204" pitchFamily="18" charset="0"/>
+                              </a:rPr>
+                              <m:t>𝐴</m:t>
+                            </m:r>
+                          </m:e>
+                        </m:acc>
+                        <m:r>
+                          <a:rPr lang="en-US" altLang="ja-JP" sz="2400" i="1" dirty="0">
+                            <a:latin typeface="Cambria Math" panose="02040503050406030204" pitchFamily="18" charset="0"/>
+                          </a:rPr>
+                          <m:t>𝑈</m:t>
+                        </m:r>
+                        <m:r>
+                          <a:rPr lang="en-US" altLang="ja-JP" sz="2400" i="1" dirty="0">
+                            <a:latin typeface="Cambria Math" panose="02040503050406030204" pitchFamily="18" charset="0"/>
+                          </a:rPr>
+                          <m:t>+</m:t>
+                        </m:r>
+                        <m:acc>
+                          <m:accPr>
+                            <m:chr m:val="̂"/>
+                            <m:ctrlPr>
+                              <a:rPr lang="en-US" altLang="ja-JP" sz="2400" i="1" dirty="0">
+                                <a:latin typeface="Cambria Math" panose="02040503050406030204" pitchFamily="18" charset="0"/>
+                              </a:rPr>
+                            </m:ctrlPr>
+                          </m:accPr>
+                          <m:e>
+                            <m:r>
+                              <a:rPr lang="en-US" altLang="ja-JP" sz="2400" i="1" dirty="0">
+                                <a:latin typeface="Cambria Math" panose="02040503050406030204" pitchFamily="18" charset="0"/>
+                              </a:rPr>
+                              <m:t>𝐵</m:t>
+                            </m:r>
+                          </m:e>
+                        </m:acc>
+                        <m:r>
+                          <a:rPr lang="en-US" altLang="ja-JP" sz="2400" i="1" dirty="0">
+                            <a:latin typeface="Cambria Math" panose="02040503050406030204" pitchFamily="18" charset="0"/>
+                          </a:rPr>
+                          <m:t>𝐶</m:t>
+                        </m:r>
+                      </m:oMath>
+                    </m:oMathPara>
+                  </a14:m>
+                  <a:endParaRPr lang="en-US" altLang="ja-JP" dirty="0"/>
+                </a:p>
+              </p:txBody>
+            </p:sp>
+          </mc:Choice>
+          <mc:Fallback xmlns="">
+            <p:sp>
+              <p:nvSpPr>
+                <p:cNvPr id="8" name="テキスト ボックス 7"/>
+                <p:cNvSpPr txBox="1">
+                  <a:spLocks noRot="1" noChangeAspect="1" noMove="1" noResize="1" noEditPoints="1" noAdjustHandles="1" noChangeArrowheads="1" noChangeShapeType="1" noTextEdit="1"/>
+                </p:cNvSpPr>
+                <p:nvPr/>
+              </p:nvSpPr>
+              <p:spPr>
+                <a:xfrm>
+                  <a:off x="4065022" y="2911157"/>
+                  <a:ext cx="3028336" cy="474169"/>
+                </a:xfrm>
+                <a:prstGeom prst="rect">
+                  <a:avLst/>
+                </a:prstGeom>
+                <a:blipFill rotWithShape="0">
+                  <a:blip r:embed="rId5"/>
+                  <a:stretch>
+                    <a:fillRect/>
+                  </a:stretch>
+                </a:blipFill>
+              </p:spPr>
+              <p:txBody>
+                <a:bodyPr/>
+                <a:lstStyle/>
+                <a:p>
+                  <a:r>
+                    <a:rPr lang="ja-JP" altLang="en-US">
+                      <a:noFill/>
+                    </a:rPr>
+                    <a:t> </a:t>
+                  </a:r>
+                </a:p>
+              </p:txBody>
+            </p:sp>
+          </mc:Fallback>
+        </mc:AlternateContent>
+        <mc:AlternateContent xmlns:mc="http://schemas.openxmlformats.org/markup-compatibility/2006" xmlns:a14="http://schemas.microsoft.com/office/drawing/2010/main">
+          <mc:Choice Requires="a14">
+            <p:sp>
+              <p:nvSpPr>
+                <p:cNvPr id="9" name="テキスト ボックス 8"/>
+                <p:cNvSpPr txBox="1"/>
+                <p:nvPr/>
+              </p:nvSpPr>
+              <p:spPr>
+                <a:xfrm>
+                  <a:off x="4409150" y="3385326"/>
+                  <a:ext cx="1268362" cy="471732"/>
+                </a:xfrm>
+                <a:prstGeom prst="rect">
+                  <a:avLst/>
+                </a:prstGeom>
+                <a:noFill/>
+              </p:spPr>
+              <p:txBody>
+                <a:bodyPr wrap="square" rtlCol="0">
+                  <a:spAutoFit/>
+                </a:bodyPr>
+                <a:lstStyle/>
+                <a:p>
+                  <a:pPr/>
+                  <a14:m>
+                    <m:oMathPara xmlns:m="http://schemas.openxmlformats.org/officeDocument/2006/math">
+                      <m:oMathParaPr>
+                        <m:jc m:val="centerGroup"/>
+                      </m:oMathParaPr>
+                      <m:oMath xmlns:m="http://schemas.openxmlformats.org/officeDocument/2006/math">
+                        <m:r>
+                          <a:rPr lang="en-US" altLang="ja-JP" sz="2400" i="1">
+                            <a:latin typeface="Cambria Math" panose="02040503050406030204" pitchFamily="18" charset="0"/>
+                          </a:rPr>
+                          <m:t>𝑈𝐵</m:t>
+                        </m:r>
+                        <m:r>
+                          <a:rPr lang="en-US" altLang="ja-JP" sz="2400" i="1">
+                            <a:latin typeface="Cambria Math" panose="02040503050406030204" pitchFamily="18" charset="0"/>
+                          </a:rPr>
+                          <m:t>=</m:t>
+                        </m:r>
+                        <m:acc>
+                          <m:accPr>
+                            <m:chr m:val="̂"/>
+                            <m:ctrlPr>
+                              <a:rPr lang="en-US" altLang="ja-JP" sz="2400" i="1">
+                                <a:latin typeface="Cambria Math" panose="02040503050406030204" pitchFamily="18" charset="0"/>
+                              </a:rPr>
+                            </m:ctrlPr>
+                          </m:accPr>
+                          <m:e>
+                            <m:r>
+                              <a:rPr lang="en-US" altLang="ja-JP" sz="2400" i="1">
+                                <a:latin typeface="Cambria Math" panose="02040503050406030204" pitchFamily="18" charset="0"/>
+                              </a:rPr>
+                              <m:t>𝐽</m:t>
+                            </m:r>
+                          </m:e>
+                        </m:acc>
+                      </m:oMath>
+                    </m:oMathPara>
+                  </a14:m>
+                  <a:endParaRPr kumimoji="1" lang="ja-JP" altLang="en-US" dirty="0"/>
+                </a:p>
+              </p:txBody>
+            </p:sp>
+          </mc:Choice>
+          <mc:Fallback xmlns="">
+            <p:sp>
+              <p:nvSpPr>
+                <p:cNvPr id="9" name="テキスト ボックス 8"/>
+                <p:cNvSpPr txBox="1">
+                  <a:spLocks noRot="1" noChangeAspect="1" noMove="1" noResize="1" noEditPoints="1" noAdjustHandles="1" noChangeArrowheads="1" noChangeShapeType="1" noTextEdit="1"/>
+                </p:cNvSpPr>
+                <p:nvPr/>
+              </p:nvSpPr>
+              <p:spPr>
+                <a:xfrm>
+                  <a:off x="4409150" y="3385326"/>
+                  <a:ext cx="1268362" cy="471732"/>
+                </a:xfrm>
+                <a:prstGeom prst="rect">
+                  <a:avLst/>
+                </a:prstGeom>
+                <a:blipFill rotWithShape="0">
+                  <a:blip r:embed="rId6"/>
+                  <a:stretch>
+                    <a:fillRect/>
+                  </a:stretch>
+                </a:blipFill>
+              </p:spPr>
+              <p:txBody>
+                <a:bodyPr/>
+                <a:lstStyle/>
+                <a:p>
+                  <a:r>
+                    <a:rPr lang="ja-JP" altLang="en-US">
+                      <a:noFill/>
+                    </a:rPr>
+                    <a:t> </a:t>
+                  </a:r>
+                </a:p>
+              </p:txBody>
+            </p:sp>
+          </mc:Fallback>
+        </mc:AlternateContent>
+        <mc:AlternateContent xmlns:mc="http://schemas.openxmlformats.org/markup-compatibility/2006" xmlns:a14="http://schemas.microsoft.com/office/drawing/2010/main">
+          <mc:Choice Requires="a14">
+            <p:sp>
+              <p:nvSpPr>
+                <p:cNvPr id="10" name="テキスト ボックス 9"/>
+                <p:cNvSpPr txBox="1"/>
+                <p:nvPr/>
+              </p:nvSpPr>
+              <p:spPr>
+                <a:xfrm>
+                  <a:off x="4336643" y="3855559"/>
+                  <a:ext cx="2192284" cy="474169"/>
+                </a:xfrm>
+                <a:prstGeom prst="rect">
+                  <a:avLst/>
+                </a:prstGeom>
+                <a:noFill/>
+              </p:spPr>
+              <p:txBody>
+                <a:bodyPr wrap="square" rtlCol="0">
+                  <a:spAutoFit/>
+                </a:bodyPr>
+                <a:lstStyle/>
+                <a:p>
+                  <a:pPr/>
+                  <a14:m>
+                    <m:oMathPara xmlns:m="http://schemas.openxmlformats.org/officeDocument/2006/math">
+                      <m:oMathParaPr>
+                        <m:jc m:val="centerGroup"/>
+                      </m:oMathParaPr>
+                      <m:oMath xmlns:m="http://schemas.openxmlformats.org/officeDocument/2006/math">
+                        <m:r>
+                          <a:rPr lang="en-US" altLang="ja-JP" sz="2400" i="1">
+                            <a:latin typeface="Cambria Math" panose="02040503050406030204" pitchFamily="18" charset="0"/>
+                          </a:rPr>
+                          <m:t>𝐼</m:t>
+                        </m:r>
+                        <m:r>
+                          <a:rPr lang="en-US" altLang="ja-JP" sz="2400" i="1">
+                            <a:latin typeface="Cambria Math" panose="02040503050406030204" pitchFamily="18" charset="0"/>
+                          </a:rPr>
+                          <m:t>=</m:t>
+                        </m:r>
+                        <m:acc>
+                          <m:accPr>
+                            <m:chr m:val="̂"/>
+                            <m:ctrlPr>
+                              <a:rPr lang="en-US" altLang="ja-JP" sz="2400" i="1">
+                                <a:latin typeface="Cambria Math" panose="02040503050406030204" pitchFamily="18" charset="0"/>
+                              </a:rPr>
+                            </m:ctrlPr>
+                          </m:accPr>
+                          <m:e>
+                            <m:r>
+                              <a:rPr lang="en-US" altLang="ja-JP" sz="2400" i="1">
+                                <a:latin typeface="Cambria Math" panose="02040503050406030204" pitchFamily="18" charset="0"/>
+                              </a:rPr>
+                              <m:t>𝐶</m:t>
+                            </m:r>
+                          </m:e>
+                        </m:acc>
+                        <m:r>
+                          <a:rPr lang="en-US" altLang="ja-JP" sz="2400" i="1" dirty="0">
+                            <a:latin typeface="Cambria Math" panose="02040503050406030204" pitchFamily="18" charset="0"/>
+                          </a:rPr>
+                          <m:t>𝑈</m:t>
+                        </m:r>
+                        <m:r>
+                          <a:rPr lang="en-US" altLang="ja-JP" sz="2400" i="1" dirty="0">
+                            <a:latin typeface="Cambria Math" panose="02040503050406030204" pitchFamily="18" charset="0"/>
+                          </a:rPr>
+                          <m:t>+</m:t>
+                        </m:r>
+                        <m:acc>
+                          <m:accPr>
+                            <m:chr m:val="̂"/>
+                            <m:ctrlPr>
+                              <a:rPr lang="en-US" altLang="ja-JP" sz="2400" i="1" dirty="0">
+                                <a:latin typeface="Cambria Math" panose="02040503050406030204" pitchFamily="18" charset="0"/>
+                              </a:rPr>
+                            </m:ctrlPr>
+                          </m:accPr>
+                          <m:e>
+                            <m:r>
+                              <a:rPr lang="en-US" altLang="ja-JP" sz="2400" i="1" dirty="0">
+                                <a:latin typeface="Cambria Math" panose="02040503050406030204" pitchFamily="18" charset="0"/>
+                              </a:rPr>
+                              <m:t>𝐷</m:t>
+                            </m:r>
+                          </m:e>
+                        </m:acc>
+                        <m:r>
+                          <a:rPr lang="en-US" altLang="ja-JP" sz="2400" i="1" dirty="0">
+                            <a:latin typeface="Cambria Math" panose="02040503050406030204" pitchFamily="18" charset="0"/>
+                          </a:rPr>
+                          <m:t>𝐶</m:t>
+                        </m:r>
+                      </m:oMath>
+                    </m:oMathPara>
+                  </a14:m>
+                  <a:endParaRPr lang="en-US" altLang="ja-JP" dirty="0"/>
+                </a:p>
+              </p:txBody>
+            </p:sp>
+          </mc:Choice>
+          <mc:Fallback xmlns="">
+            <p:sp>
+              <p:nvSpPr>
+                <p:cNvPr id="10" name="テキスト ボックス 9"/>
+                <p:cNvSpPr txBox="1">
+                  <a:spLocks noRot="1" noChangeAspect="1" noMove="1" noResize="1" noEditPoints="1" noAdjustHandles="1" noChangeArrowheads="1" noChangeShapeType="1" noTextEdit="1"/>
+                </p:cNvSpPr>
+                <p:nvPr/>
+              </p:nvSpPr>
+              <p:spPr>
+                <a:xfrm>
+                  <a:off x="4336643" y="3855559"/>
+                  <a:ext cx="2192284" cy="474169"/>
+                </a:xfrm>
+                <a:prstGeom prst="rect">
+                  <a:avLst/>
+                </a:prstGeom>
+                <a:blipFill rotWithShape="0">
+                  <a:blip r:embed="rId7"/>
+                  <a:stretch>
+                    <a:fillRect/>
+                  </a:stretch>
+                </a:blipFill>
+              </p:spPr>
+              <p:txBody>
+                <a:bodyPr/>
+                <a:lstStyle/>
+                <a:p>
+                  <a:r>
+                    <a:rPr lang="ja-JP" altLang="en-US">
+                      <a:noFill/>
+                    </a:rPr>
+                    <a:t> </a:t>
+                  </a:r>
+                </a:p>
+              </p:txBody>
+            </p:sp>
+          </mc:Fallback>
+        </mc:AlternateContent>
+      </p:grpSp>
+      <p:sp>
+        <p:nvSpPr>
+          <p:cNvPr id="12" name="下矢印 11"/>
+          <p:cNvSpPr/>
+          <p:nvPr/>
+        </p:nvSpPr>
+        <p:spPr>
+          <a:xfrm>
+            <a:off x="2169245" y="3675797"/>
+            <a:ext cx="1897625" cy="459006"/>
+          </a:xfrm>
+          <a:prstGeom prst="downArrow">
+            <a:avLst/>
+          </a:prstGeom>
+        </p:spPr>
+        <p:style>
+          <a:lnRef idx="2">
+            <a:schemeClr val="accent1">
+              <a:shade val="50000"/>
+            </a:schemeClr>
+          </a:lnRef>
+          <a:fillRef idx="1">
+            <a:schemeClr val="accent1"/>
+          </a:fillRef>
+          <a:effectRef idx="0">
+            <a:schemeClr val="accent1"/>
+          </a:effectRef>
+          <a:fontRef idx="minor">
+            <a:schemeClr val="lt1"/>
+          </a:fontRef>
+        </p:style>
+        <p:txBody>
+          <a:bodyPr rtlCol="0" anchor="ctr"/>
+          <a:lstStyle/>
+          <a:p>
+            <a:pPr algn="ctr"/>
+            <a:endParaRPr kumimoji="1" lang="ja-JP" altLang="en-US"/>
+          </a:p>
+        </p:txBody>
+      </p:sp>
+      <mc:AlternateContent xmlns:mc="http://schemas.openxmlformats.org/markup-compatibility/2006">
+        <mc:Choice xmlns:a14="http://schemas.microsoft.com/office/drawing/2010/main" Requires="a14">
+          <p:sp>
+            <p:nvSpPr>
+              <p:cNvPr id="14" name="テキスト ボックス 13"/>
+              <p:cNvSpPr txBox="1"/>
+              <p:nvPr/>
+            </p:nvSpPr>
+            <p:spPr>
+              <a:xfrm>
+                <a:off x="2016842" y="5530647"/>
+                <a:ext cx="3818350" cy="843501"/>
+              </a:xfrm>
+              <a:prstGeom prst="rect">
+                <a:avLst/>
+              </a:prstGeom>
+              <a:noFill/>
+            </p:spPr>
+            <p:txBody>
+              <a:bodyPr wrap="square" rtlCol="0">
+                <a:spAutoFit/>
+              </a:bodyPr>
+              <a:lstStyle/>
+              <a:p>
+                <a:r>
+                  <a:rPr lang="ja-JP" altLang="en-US" sz="2400" dirty="0" smtClean="0"/>
+                  <a:t>かつ</a:t>
+                </a:r>
+                <a:endParaRPr lang="en-US" altLang="ja-JP" sz="2400" dirty="0" smtClean="0"/>
+              </a:p>
+              <a:p>
+                <a14:m>
+                  <m:oMath xmlns:m="http://schemas.openxmlformats.org/officeDocument/2006/math">
+                    <m:acc>
+                      <m:accPr>
+                        <m:chr m:val="̂"/>
+                        <m:ctrlPr>
+                          <a:rPr lang="en-US" altLang="ja-JP" sz="2400" i="1">
+                            <a:latin typeface="Cambria Math" panose="02040503050406030204" pitchFamily="18" charset="0"/>
+                          </a:rPr>
+                        </m:ctrlPr>
+                      </m:accPr>
+                      <m:e>
+                        <m:r>
+                          <a:rPr lang="en-US" altLang="ja-JP" sz="2400" i="1">
+                            <a:latin typeface="Cambria Math" panose="02040503050406030204" pitchFamily="18" charset="0"/>
+                          </a:rPr>
+                          <m:t>𝐴</m:t>
+                        </m:r>
+                      </m:e>
+                    </m:acc>
+                  </m:oMath>
+                </a14:m>
+                <a:r>
+                  <a:rPr kumimoji="1" lang="ja-JP" altLang="en-US" sz="2400" dirty="0" smtClean="0"/>
+                  <a:t>が安定行列であること</a:t>
+                </a:r>
+                <a:endParaRPr kumimoji="1" lang="ja-JP" altLang="en-US" sz="2400" dirty="0"/>
+              </a:p>
+            </p:txBody>
+          </p:sp>
+        </mc:Choice>
+        <mc:Fallback>
+          <p:sp>
+            <p:nvSpPr>
+              <p:cNvPr id="14" name="テキスト ボックス 13"/>
+              <p:cNvSpPr txBox="1">
+                <a:spLocks noRot="1" noChangeAspect="1" noMove="1" noResize="1" noEditPoints="1" noAdjustHandles="1" noChangeArrowheads="1" noChangeShapeType="1" noTextEdit="1"/>
+              </p:cNvSpPr>
+              <p:nvPr/>
+            </p:nvSpPr>
+            <p:spPr>
+              <a:xfrm>
+                <a:off x="2016842" y="5530647"/>
+                <a:ext cx="3818350" cy="843501"/>
+              </a:xfrm>
+              <a:prstGeom prst="rect">
+                <a:avLst/>
+              </a:prstGeom>
+              <a:blipFill>
                 <a:blip r:embed="rId8"/>
                 <a:stretch>
-                  <a:fillRect l="-2957" t="-7194" b="-12950"/>
+                  <a:fillRect l="-2556" t="-5755" b="-15827"/>
                 </a:stretch>
               </a:blipFill>
             </p:spPr>
@@ -17147,10 +18588,34 @@
           </a:p>
         </p:txBody>
       </p:sp>
+      <p:sp>
+        <p:nvSpPr>
+          <p:cNvPr id="7" name="スライド番号プレースホルダー 6"/>
+          <p:cNvSpPr>
+            <a:spLocks noGrp="1"/>
+          </p:cNvSpPr>
+          <p:nvPr>
+            <p:ph type="sldNum" sz="quarter" idx="12"/>
+          </p:nvPr>
+        </p:nvSpPr>
+        <p:spPr/>
+        <p:txBody>
+          <a:bodyPr/>
+          <a:lstStyle/>
+          <a:p>
+            <a:fld id="{879872E2-8930-43A6-82EA-52DD58EFA9F7}" type="slidenum">
+              <a:rPr lang="ja-JP" altLang="en-US" smtClean="0"/>
+              <a:pPr/>
+              <a:t>43</a:t>
+            </a:fld>
+            <a:endParaRPr lang="ja-JP" altLang="en-US" dirty="0"/>
+          </a:p>
+        </p:txBody>
+      </p:sp>
     </p:spTree>
     <p:extLst>
       <p:ext uri="{BB962C8B-B14F-4D97-AF65-F5344CB8AC3E}">
-        <p14:creationId xmlns:p14="http://schemas.microsoft.com/office/powerpoint/2010/main" val="863932517"/>
+        <p14:creationId xmlns:p14="http://schemas.microsoft.com/office/powerpoint/2010/main" val="688085100"/>
       </p:ext>
     </p:extLst>
   </p:cSld>
@@ -17169,6 +18634,9 @@
                     <p:cTn id="3" fill="hold">
                       <p:stCondLst>
                         <p:cond delay="indefinite"/>
+                        <p:cond evt="onBegin" delay="0">
+                          <p:tn val="2"/>
+                        </p:cond>
                       </p:stCondLst>
                       <p:childTnLst>
                         <p:par>
@@ -17178,7 +18646,7 @@
                             </p:stCondLst>
                             <p:childTnLst>
                               <p:par>
-                                <p:cTn id="5" presetID="10" presetClass="entr" presetSubtype="0" fill="hold" grpId="0" nodeType="clickEffect">
+                                <p:cTn id="5" presetID="10" presetClass="entr" presetSubtype="0" fill="hold" grpId="0" nodeType="withEffect">
                                   <p:stCondLst>
                                     <p:cond delay="0"/>
                                   </p:stCondLst>
@@ -17246,7 +18714,7 @@
 </p:sld>
 </file>
 
-<file path=ppt/slides/slide43.xml><?xml version="1.0" encoding="utf-8"?>
+<file path=ppt/slides/slide44.xml><?xml version="1.0" encoding="utf-8"?>
 <p:sld xmlns:a="http://schemas.openxmlformats.org/drawingml/2006/main" xmlns:r="http://schemas.openxmlformats.org/officeDocument/2006/relationships" xmlns:p="http://schemas.openxmlformats.org/presentationml/2006/main">
   <p:cSld>
     <p:spTree>
@@ -17737,6 +19205,30 @@
           </a:prstGeom>
         </p:spPr>
       </p:pic>
+      <p:sp>
+        <p:nvSpPr>
+          <p:cNvPr id="6" name="スライド番号プレースホルダー 5"/>
+          <p:cNvSpPr>
+            <a:spLocks noGrp="1"/>
+          </p:cNvSpPr>
+          <p:nvPr>
+            <p:ph type="sldNum" sz="quarter" idx="12"/>
+          </p:nvPr>
+        </p:nvSpPr>
+        <p:spPr/>
+        <p:txBody>
+          <a:bodyPr/>
+          <a:lstStyle/>
+          <a:p>
+            <a:fld id="{879872E2-8930-43A6-82EA-52DD58EFA9F7}" type="slidenum">
+              <a:rPr lang="ja-JP" altLang="en-US" smtClean="0"/>
+              <a:pPr/>
+              <a:t>44</a:t>
+            </a:fld>
+            <a:endParaRPr lang="ja-JP" altLang="en-US" dirty="0"/>
+          </a:p>
+        </p:txBody>
+      </p:sp>
     </p:spTree>
     <p:extLst>
       <p:ext uri="{BB962C8B-B14F-4D97-AF65-F5344CB8AC3E}">
@@ -17757,7 +19249,7 @@
 </p:sld>
 </file>
 
-<file path=ppt/slides/slide44.xml><?xml version="1.0" encoding="utf-8"?>
+<file path=ppt/slides/slide45.xml><?xml version="1.0" encoding="utf-8"?>
 <p:sld xmlns:a="http://schemas.openxmlformats.org/drawingml/2006/main" xmlns:r="http://schemas.openxmlformats.org/officeDocument/2006/relationships" xmlns:p="http://schemas.openxmlformats.org/presentationml/2006/main">
   <p:cSld>
     <p:spTree>
@@ -17937,7 +19429,7 @@
         </p:blipFill>
         <p:spPr>
           <a:xfrm>
-            <a:off x="1406394" y="2247615"/>
+            <a:off x="1406394" y="1695004"/>
             <a:ext cx="3804704" cy="505312"/>
           </a:xfrm>
           <a:prstGeom prst="rect">
@@ -17967,7 +19459,7 @@
         </p:blipFill>
         <p:spPr>
           <a:xfrm>
-            <a:off x="1406394" y="3174917"/>
+            <a:off x="1406394" y="2701079"/>
             <a:ext cx="4277037" cy="497734"/>
           </a:xfrm>
           <a:prstGeom prst="rect">
@@ -17997,7 +19489,7 @@
         </p:blipFill>
         <p:spPr>
           <a:xfrm>
-            <a:off x="1406394" y="4094641"/>
+            <a:off x="1407418" y="3561552"/>
             <a:ext cx="2034638" cy="520089"/>
           </a:xfrm>
           <a:prstGeom prst="rect">
@@ -18027,7 +19519,7 @@
         </p:blipFill>
         <p:spPr>
           <a:xfrm>
-            <a:off x="1406395" y="5021943"/>
+            <a:off x="1406394" y="4609248"/>
             <a:ext cx="6137406" cy="1102701"/>
           </a:xfrm>
           <a:prstGeom prst="rect">
@@ -18035,8 +19527,8 @@
           </a:prstGeom>
         </p:spPr>
       </p:pic>
-      <mc:AlternateContent xmlns:mc="http://schemas.openxmlformats.org/markup-compatibility/2006" xmlns:a14="http://schemas.microsoft.com/office/drawing/2010/main">
-        <mc:Choice Requires="a14">
+      <mc:AlternateContent xmlns:mc="http://schemas.openxmlformats.org/markup-compatibility/2006">
+        <mc:Choice xmlns:a14="http://schemas.microsoft.com/office/drawing/2010/main" Requires="a14">
           <p:sp>
             <p:nvSpPr>
               <p:cNvPr id="10" name="テキスト ボックス 9"/>
@@ -18045,7 +19537,7 @@
             </p:nvSpPr>
             <p:spPr>
               <a:xfrm>
-                <a:off x="416701" y="6120168"/>
+                <a:off x="416701" y="6000163"/>
                 <a:ext cx="6256421" cy="478785"/>
               </a:xfrm>
               <a:prstGeom prst="rect">
@@ -18194,7 +19686,7 @@
             </p:txBody>
           </p:sp>
         </mc:Choice>
-        <mc:Fallback xmlns="">
+        <mc:Fallback>
           <p:sp>
             <p:nvSpPr>
               <p:cNvPr id="10" name="テキスト ボックス 9"/>
@@ -18205,16 +19697,16 @@
             </p:nvSpPr>
             <p:spPr>
               <a:xfrm>
-                <a:off x="416701" y="6120168"/>
+                <a:off x="416701" y="6000163"/>
                 <a:ext cx="6256421" cy="478785"/>
               </a:xfrm>
               <a:prstGeom prst="rect">
                 <a:avLst/>
               </a:prstGeom>
-              <a:blipFill rotWithShape="0">
+              <a:blipFill>
                 <a:blip r:embed="rId7"/>
                 <a:stretch>
-                  <a:fillRect t="-10127" b="-27848"/>
+                  <a:fillRect t="-7595" b="-27848"/>
                 </a:stretch>
               </a:blipFill>
             </p:spPr>
@@ -18233,6 +19725,30 @@
           </p:sp>
         </mc:Fallback>
       </mc:AlternateContent>
+      <p:sp>
+        <p:nvSpPr>
+          <p:cNvPr id="4" name="スライド番号プレースホルダー 3"/>
+          <p:cNvSpPr>
+            <a:spLocks noGrp="1"/>
+          </p:cNvSpPr>
+          <p:nvPr>
+            <p:ph type="sldNum" sz="quarter" idx="12"/>
+          </p:nvPr>
+        </p:nvSpPr>
+        <p:spPr/>
+        <p:txBody>
+          <a:bodyPr/>
+          <a:lstStyle/>
+          <a:p>
+            <a:fld id="{879872E2-8930-43A6-82EA-52DD58EFA9F7}" type="slidenum">
+              <a:rPr lang="ja-JP" altLang="en-US" smtClean="0"/>
+              <a:pPr/>
+              <a:t>45</a:t>
+            </a:fld>
+            <a:endParaRPr lang="ja-JP" altLang="en-US" dirty="0"/>
+          </a:p>
+        </p:txBody>
+      </p:sp>
     </p:spTree>
     <p:extLst>
       <p:ext uri="{BB962C8B-B14F-4D97-AF65-F5344CB8AC3E}">
@@ -18253,7 +19769,7 @@
 </p:sld>
 </file>
 
-<file path=ppt/slides/slide45.xml><?xml version="1.0" encoding="utf-8"?>
+<file path=ppt/slides/slide46.xml><?xml version="1.0" encoding="utf-8"?>
 <p:sld xmlns:a="http://schemas.openxmlformats.org/drawingml/2006/main" xmlns:r="http://schemas.openxmlformats.org/officeDocument/2006/relationships" xmlns:p="http://schemas.openxmlformats.org/presentationml/2006/main">
   <p:cSld>
     <p:spTree>
@@ -18499,6 +20015,30 @@
           </a:extLst>
         </p:spPr>
       </p:pic>
+      <p:sp>
+        <p:nvSpPr>
+          <p:cNvPr id="5" name="スライド番号プレースホルダー 4"/>
+          <p:cNvSpPr>
+            <a:spLocks noGrp="1"/>
+          </p:cNvSpPr>
+          <p:nvPr>
+            <p:ph type="sldNum" sz="quarter" idx="12"/>
+          </p:nvPr>
+        </p:nvSpPr>
+        <p:spPr/>
+        <p:txBody>
+          <a:bodyPr/>
+          <a:lstStyle/>
+          <a:p>
+            <a:fld id="{879872E2-8930-43A6-82EA-52DD58EFA9F7}" type="slidenum">
+              <a:rPr lang="ja-JP" altLang="en-US" smtClean="0"/>
+              <a:pPr/>
+              <a:t>46</a:t>
+            </a:fld>
+            <a:endParaRPr lang="ja-JP" altLang="en-US" dirty="0"/>
+          </a:p>
+        </p:txBody>
+      </p:sp>
     </p:spTree>
     <p:extLst>
       <p:ext uri="{BB962C8B-B14F-4D97-AF65-F5344CB8AC3E}">

</xml_diff>